<commit_message>
changed u to you
</commit_message>
<xml_diff>
--- a/presentation.pptx
+++ b/presentation.pptx
@@ -8116,8 +8116,8 @@
           </a:p>
         </p:txBody>
       </p:sp>
-      <mc:AlternateContent xmlns:mc="http://schemas.openxmlformats.org/markup-compatibility/2006" xmlns:a14="http://schemas.microsoft.com/office/drawing/2010/main">
-        <mc:Choice Requires="a14">
+      <mc:AlternateContent xmlns:mc="http://schemas.openxmlformats.org/markup-compatibility/2006">
+        <mc:Choice xmlns:a14="http://schemas.microsoft.com/office/drawing/2010/main" Requires="a14">
           <p:sp>
             <p:nvSpPr>
               <p:cNvPr id="4" name="TextBox 3">
@@ -8187,7 +8187,7 @@
               <a:p>
                 <a:r>
                   <a:rPr lang="en-GB" dirty="0"/>
-                  <a:t>This will give u a random point </a:t>
+                  <a:t>This will give you a random point </a:t>
                 </a:r>
                 <a14:m>
                   <m:oMath xmlns:m="http://schemas.openxmlformats.org/officeDocument/2006/math">
@@ -8570,7 +8570,7 @@
             </p:txBody>
           </p:sp>
         </mc:Choice>
-        <mc:Fallback xmlns="">
+        <mc:Fallback>
           <p:sp>
             <p:nvSpPr>
               <p:cNvPr id="4" name="TextBox 3">
@@ -9752,7 +9752,7 @@
                 </a:solidFill>
                 <a:effectLst/>
               </a:rPr>
-              <a:t>This is computationally complex due to the randomness and interaction of light rays in a scene.</a:t>
+              <a:t> This is computationally complex due to the randomness and interaction of light rays in a scene.</a:t>
             </a:r>
           </a:p>
           <a:p>
@@ -9779,7 +9779,7 @@
                 </a:solidFill>
                 <a:effectLst/>
               </a:rPr>
-              <a:t>In 1986, James Kajiya introduced the Rendering Equation, which mathematically describes the total light at a point.</a:t>
+              <a:t> In 1986, James Kajiya introduced the Rendering Equation, which mathematically describes the total light at a point.</a:t>
             </a:r>
           </a:p>
           <a:p>
@@ -9806,7 +9806,7 @@
                 </a:solidFill>
                 <a:effectLst/>
               </a:rPr>
-              <a:t>Monte Carlo Integration is widely used to solve this equation by simulating random light paths—ideal for handling the complexity of real-world lighting.</a:t>
+              <a:t> Monte Carlo Integration is widely used to solve this equation by simulating random light paths—ideal for handling the complexity of real-world lighting.</a:t>
             </a:r>
           </a:p>
           <a:p>

</xml_diff>